<commit_message>
updated slides and lab
</commit_message>
<xml_diff>
--- a/topic00-processing/talk-1/a-intro-to-programming.pptx
+++ b/topic00-processing/talk-1/a-intro-to-programming.pptx
@@ -224,7 +224,7 @@
           <a:p>
             <a:fld id="{58C3D141-1E1C-433C-AD3A-CD56CBBB4F9F}" type="datetimeFigureOut">
               <a:rPr lang="en-IE" smtClean="0"/>
-              <a:t>08/12/2025</a:t>
+              <a:t>09/12/2025</a:t>
             </a:fld>
             <a:endParaRPr lang="en-IE"/>
           </a:p>
@@ -756,7 +756,7 @@
             <a:fld id="{1D8BD707-D9CF-40AE-B4C6-C98DA3205C09}" type="datetimeFigureOut">
               <a:rPr lang="en-US" smtClean="0"/>
               <a:pPr/>
-              <a:t>12/8/2025</a:t>
+              <a:t>12/9/2025</a:t>
             </a:fld>
             <a:endParaRPr lang="en-US"/>
           </a:p>
@@ -921,7 +921,7 @@
             <a:fld id="{1D8BD707-D9CF-40AE-B4C6-C98DA3205C09}" type="datetimeFigureOut">
               <a:rPr lang="en-US" smtClean="0"/>
               <a:pPr/>
-              <a:t>12/8/2025</a:t>
+              <a:t>12/9/2025</a:t>
             </a:fld>
             <a:endParaRPr lang="en-US"/>
           </a:p>
@@ -1096,7 +1096,7 @@
             <a:fld id="{1D8BD707-D9CF-40AE-B4C6-C98DA3205C09}" type="datetimeFigureOut">
               <a:rPr lang="en-US" smtClean="0"/>
               <a:pPr/>
-              <a:t>12/8/2025</a:t>
+              <a:t>12/9/2025</a:t>
             </a:fld>
             <a:endParaRPr lang="en-US"/>
           </a:p>
@@ -1272,7 +1272,7 @@
             <a:fld id="{1D8BD707-D9CF-40AE-B4C6-C98DA3205C09}" type="datetimeFigureOut">
               <a:rPr lang="en-US" smtClean="0"/>
               <a:pPr/>
-              <a:t>12/8/2025</a:t>
+              <a:t>12/9/2025</a:t>
             </a:fld>
             <a:endParaRPr lang="en-US"/>
           </a:p>
@@ -1552,7 +1552,7 @@
             <a:fld id="{1D8BD707-D9CF-40AE-B4C6-C98DA3205C09}" type="datetimeFigureOut">
               <a:rPr lang="en-US" smtClean="0"/>
               <a:pPr/>
-              <a:t>12/8/2025</a:t>
+              <a:t>12/9/2025</a:t>
             </a:fld>
             <a:endParaRPr lang="en-US"/>
           </a:p>
@@ -1845,7 +1845,7 @@
             <a:fld id="{1D8BD707-D9CF-40AE-B4C6-C98DA3205C09}" type="datetimeFigureOut">
               <a:rPr lang="en-US" smtClean="0"/>
               <a:pPr/>
-              <a:t>12/8/2025</a:t>
+              <a:t>12/9/2025</a:t>
             </a:fld>
             <a:endParaRPr lang="en-US"/>
           </a:p>
@@ -2303,7 +2303,7 @@
             <a:fld id="{1D8BD707-D9CF-40AE-B4C6-C98DA3205C09}" type="datetimeFigureOut">
               <a:rPr lang="en-US" smtClean="0"/>
               <a:pPr/>
-              <a:t>12/8/2025</a:t>
+              <a:t>12/9/2025</a:t>
             </a:fld>
             <a:endParaRPr lang="en-US"/>
           </a:p>
@@ -2463,7 +2463,7 @@
             <a:fld id="{1D8BD707-D9CF-40AE-B4C6-C98DA3205C09}" type="datetimeFigureOut">
               <a:rPr lang="en-US" smtClean="0"/>
               <a:pPr/>
-              <a:t>12/8/2025</a:t>
+              <a:t>12/9/2025</a:t>
             </a:fld>
             <a:endParaRPr lang="en-US"/>
           </a:p>
@@ -2590,7 +2590,7 @@
             <a:fld id="{1D8BD707-D9CF-40AE-B4C6-C98DA3205C09}" type="datetimeFigureOut">
               <a:rPr lang="en-US" smtClean="0"/>
               <a:pPr/>
-              <a:t>12/8/2025</a:t>
+              <a:t>12/9/2025</a:t>
             </a:fld>
             <a:endParaRPr lang="en-US"/>
           </a:p>
@@ -2862,7 +2862,7 @@
             <a:fld id="{1D8BD707-D9CF-40AE-B4C6-C98DA3205C09}" type="datetimeFigureOut">
               <a:rPr lang="en-US" smtClean="0"/>
               <a:pPr/>
-              <a:t>12/8/2025</a:t>
+              <a:t>12/9/2025</a:t>
             </a:fld>
             <a:endParaRPr lang="en-US"/>
           </a:p>
@@ -3111,7 +3111,7 @@
             <a:fld id="{1D8BD707-D9CF-40AE-B4C6-C98DA3205C09}" type="datetimeFigureOut">
               <a:rPr lang="en-US" smtClean="0"/>
               <a:pPr/>
-              <a:t>12/8/2025</a:t>
+              <a:t>12/9/2025</a:t>
             </a:fld>
             <a:endParaRPr lang="en-US"/>
           </a:p>
@@ -3319,7 +3319,7 @@
             <a:fld id="{1D8BD707-D9CF-40AE-B4C6-C98DA3205C09}" type="datetimeFigureOut">
               <a:rPr lang="en-US" smtClean="0"/>
               <a:pPr/>
-              <a:t>12/8/2025</a:t>
+              <a:t>12/9/2025</a:t>
             </a:fld>
             <a:endParaRPr lang="en-US"/>
           </a:p>
@@ -6370,15 +6370,6 @@
           <a:solidFill>
             <a:srgbClr val="FFFFFF"/>
           </a:solidFill>
-          <a:extLst>
-            <a:ext uri="{909E8E84-426E-40DD-AFC4-6F175D3DCCD1}">
-              <a14:hiddenFill xmlns:a14="http://schemas.microsoft.com/office/drawing/2010/main">
-                <a:solidFill>
-                  <a:srgbClr val="FFFFFF"/>
-                </a:solidFill>
-              </a14:hiddenFill>
-            </a:ext>
-          </a:extLst>
         </p:spPr>
       </p:pic>
     </p:spTree>
@@ -7083,15 +7074,6 @@
           <a:solidFill>
             <a:srgbClr val="FFFFFF"/>
           </a:solidFill>
-          <a:extLst>
-            <a:ext uri="{909E8E84-426E-40DD-AFC4-6F175D3DCCD1}">
-              <a14:hiddenFill xmlns:a14="http://schemas.microsoft.com/office/drawing/2010/main">
-                <a:solidFill>
-                  <a:srgbClr val="FFFFFF"/>
-                </a:solidFill>
-              </a14:hiddenFill>
-            </a:ext>
-          </a:extLst>
         </p:spPr>
       </p:pic>
     </p:spTree>
@@ -7831,15 +7813,6 @@
           <a:solidFill>
             <a:srgbClr val="FFFFFF"/>
           </a:solidFill>
-          <a:extLst>
-            <a:ext uri="{909E8E84-426E-40DD-AFC4-6F175D3DCCD1}">
-              <a14:hiddenFill xmlns:a14="http://schemas.microsoft.com/office/drawing/2010/main">
-                <a:solidFill>
-                  <a:srgbClr val="FFFFFF"/>
-                </a:solidFill>
-              </a14:hiddenFill>
-            </a:ext>
-          </a:extLst>
         </p:spPr>
       </p:pic>
     </p:spTree>
@@ -8550,7 +8523,7 @@
             </a:pPr>
             <a:r>
               <a:rPr lang="en-IE" sz="2600" dirty="0"/>
-              <a:t>Netflix recommendations → AI algorithms</a:t>
+              <a:t>Netflix recommendations </a:t>
             </a:r>
           </a:p>
           <a:p>
@@ -8561,7 +8534,7 @@
             </a:pPr>
             <a:r>
               <a:rPr lang="en-IE" sz="2600" dirty="0"/>
-              <a:t>Snapchat filters → computer vision</a:t>
+              <a:t>Snapchat filters </a:t>
             </a:r>
           </a:p>
           <a:p>
@@ -8572,7 +8545,7 @@
             </a:pPr>
             <a:r>
               <a:rPr lang="en-IE" sz="2600" dirty="0"/>
-              <a:t>Spotify playlists → machine learning</a:t>
+              <a:t>Spotify playlists </a:t>
             </a:r>
           </a:p>
           <a:p>
@@ -8583,7 +8556,7 @@
             </a:pPr>
             <a:r>
               <a:rPr lang="en-IE" sz="2600" dirty="0"/>
-              <a:t>Instagram stories → mobile apps</a:t>
+              <a:t>Instagram stories </a:t>
             </a:r>
           </a:p>
           <a:p>
@@ -8594,7 +8567,7 @@
             </a:pPr>
             <a:r>
               <a:rPr lang="en-IE" sz="2600" dirty="0"/>
-              <a:t>Self-driving cars → robotics + sensors</a:t>
+              <a:t>Self-driving cars </a:t>
             </a:r>
           </a:p>
           <a:p>
@@ -8605,7 +8578,7 @@
             </a:pPr>
             <a:r>
               <a:rPr lang="en-IE" sz="2600" dirty="0"/>
-              <a:t>Games (Fortnite, FIFA, Minecraft) → game engines + physics</a:t>
+              <a:t>Games (Fortnite, FIFA, Minecraft) </a:t>
             </a:r>
           </a:p>
           <a:p>
@@ -8616,7 +8589,7 @@
             </a:pPr>
             <a:r>
               <a:rPr lang="en-IE" sz="2600" dirty="0"/>
-              <a:t>Even toaster ovens &amp; traffic lights → embedded systems</a:t>
+              <a:t>Even toaster ovens &amp; traffic lights</a:t>
             </a:r>
           </a:p>
         </p:txBody>
@@ -8660,15 +8633,6 @@
           <a:solidFill>
             <a:srgbClr val="FFFFFF"/>
           </a:solidFill>
-          <a:extLst>
-            <a:ext uri="{909E8E84-426E-40DD-AFC4-6F175D3DCCD1}">
-              <a14:hiddenFill xmlns:a14="http://schemas.microsoft.com/office/drawing/2010/main">
-                <a:solidFill>
-                  <a:srgbClr val="FFFFFF"/>
-                </a:solidFill>
-              </a14:hiddenFill>
-            </a:ext>
-          </a:extLst>
         </p:spPr>
       </p:pic>
     </p:spTree>
@@ -8798,15 +8762,33 @@
                                   </p:childTnLst>
                                 </p:cTn>
                               </p:par>
+                            </p:childTnLst>
+                          </p:cTn>
+                        </p:par>
+                      </p:childTnLst>
+                    </p:cTn>
+                  </p:par>
+                  <p:par>
+                    <p:cTn id="10" fill="hold">
+                      <p:stCondLst>
+                        <p:cond delay="indefinite"/>
+                      </p:stCondLst>
+                      <p:childTnLst>
+                        <p:par>
+                          <p:cTn id="11" fill="hold">
+                            <p:stCondLst>
+                              <p:cond delay="0"/>
+                            </p:stCondLst>
+                            <p:childTnLst>
                               <p:par>
-                                <p:cTn id="10" presetID="45" presetClass="entr" presetSubtype="0" fill="hold" grpId="0" nodeType="withEffect">
+                                <p:cTn id="12" presetID="45" presetClass="entr" presetSubtype="0" fill="hold" grpId="0" nodeType="clickEffect">
                                   <p:stCondLst>
                                     <p:cond delay="0"/>
                                   </p:stCondLst>
                                   <p:childTnLst>
                                     <p:set>
                                       <p:cBhvr>
-                                        <p:cTn id="11" dur="1" fill="hold">
+                                        <p:cTn id="13" dur="1" fill="hold">
                                           <p:stCondLst>
                                             <p:cond delay="0"/>
                                           </p:stCondLst>
@@ -8828,7 +8810,7 @@
                                     </p:set>
                                     <p:animEffect transition="in" filter="fade">
                                       <p:cBhvr>
-                                        <p:cTn id="12" dur="2000"/>
+                                        <p:cTn id="14" dur="2000"/>
                                         <p:tgtEl>
                                           <p:spTgt spid="3">
                                             <p:txEl>
@@ -8840,7 +8822,7 @@
                                     </p:animEffect>
                                     <p:anim calcmode="lin" valueType="num">
                                       <p:cBhvr>
-                                        <p:cTn id="13" dur="2000" fill="hold"/>
+                                        <p:cTn id="15" dur="2000" fill="hold"/>
                                         <p:tgtEl>
                                           <p:spTgt spid="3">
                                             <p:txEl>
@@ -8867,7 +8849,7 @@
                                     </p:anim>
                                     <p:anim calcmode="lin" valueType="num">
                                       <p:cBhvr>
-                                        <p:cTn id="14" dur="2000" fill="hold"/>
+                                        <p:cTn id="16" dur="2000" fill="hold"/>
                                         <p:tgtEl>
                                           <p:spTgt spid="3">
                                             <p:txEl>
@@ -8895,15 +8877,33 @@
                                   </p:childTnLst>
                                 </p:cTn>
                               </p:par>
+                            </p:childTnLst>
+                          </p:cTn>
+                        </p:par>
+                      </p:childTnLst>
+                    </p:cTn>
+                  </p:par>
+                  <p:par>
+                    <p:cTn id="17" fill="hold">
+                      <p:stCondLst>
+                        <p:cond delay="indefinite"/>
+                      </p:stCondLst>
+                      <p:childTnLst>
+                        <p:par>
+                          <p:cTn id="18" fill="hold">
+                            <p:stCondLst>
+                              <p:cond delay="0"/>
+                            </p:stCondLst>
+                            <p:childTnLst>
                               <p:par>
-                                <p:cTn id="15" presetID="45" presetClass="entr" presetSubtype="0" fill="hold" grpId="0" nodeType="withEffect">
+                                <p:cTn id="19" presetID="45" presetClass="entr" presetSubtype="0" fill="hold" grpId="0" nodeType="clickEffect">
                                   <p:stCondLst>
                                     <p:cond delay="0"/>
                                   </p:stCondLst>
                                   <p:childTnLst>
                                     <p:set>
                                       <p:cBhvr>
-                                        <p:cTn id="16" dur="1" fill="hold">
+                                        <p:cTn id="20" dur="1" fill="hold">
                                           <p:stCondLst>
                                             <p:cond delay="0"/>
                                           </p:stCondLst>
@@ -8925,7 +8925,7 @@
                                     </p:set>
                                     <p:animEffect transition="in" filter="fade">
                                       <p:cBhvr>
-                                        <p:cTn id="17" dur="2000"/>
+                                        <p:cTn id="21" dur="2000"/>
                                         <p:tgtEl>
                                           <p:spTgt spid="3">
                                             <p:txEl>
@@ -8937,7 +8937,7 @@
                                     </p:animEffect>
                                     <p:anim calcmode="lin" valueType="num">
                                       <p:cBhvr>
-                                        <p:cTn id="18" dur="2000" fill="hold"/>
+                                        <p:cTn id="22" dur="2000" fill="hold"/>
                                         <p:tgtEl>
                                           <p:spTgt spid="3">
                                             <p:txEl>
@@ -8964,7 +8964,7 @@
                                     </p:anim>
                                     <p:anim calcmode="lin" valueType="num">
                                       <p:cBhvr>
-                                        <p:cTn id="19" dur="2000" fill="hold"/>
+                                        <p:cTn id="23" dur="2000" fill="hold"/>
                                         <p:tgtEl>
                                           <p:spTgt spid="3">
                                             <p:txEl>
@@ -8992,15 +8992,33 @@
                                   </p:childTnLst>
                                 </p:cTn>
                               </p:par>
+                            </p:childTnLst>
+                          </p:cTn>
+                        </p:par>
+                      </p:childTnLst>
+                    </p:cTn>
+                  </p:par>
+                  <p:par>
+                    <p:cTn id="24" fill="hold">
+                      <p:stCondLst>
+                        <p:cond delay="indefinite"/>
+                      </p:stCondLst>
+                      <p:childTnLst>
+                        <p:par>
+                          <p:cTn id="25" fill="hold">
+                            <p:stCondLst>
+                              <p:cond delay="0"/>
+                            </p:stCondLst>
+                            <p:childTnLst>
                               <p:par>
-                                <p:cTn id="20" presetID="45" presetClass="entr" presetSubtype="0" fill="hold" grpId="0" nodeType="withEffect">
+                                <p:cTn id="26" presetID="45" presetClass="entr" presetSubtype="0" fill="hold" grpId="0" nodeType="clickEffect">
                                   <p:stCondLst>
                                     <p:cond delay="0"/>
                                   </p:stCondLst>
                                   <p:childTnLst>
                                     <p:set>
                                       <p:cBhvr>
-                                        <p:cTn id="21" dur="1" fill="hold">
+                                        <p:cTn id="27" dur="1" fill="hold">
                                           <p:stCondLst>
                                             <p:cond delay="0"/>
                                           </p:stCondLst>
@@ -9022,7 +9040,7 @@
                                     </p:set>
                                     <p:animEffect transition="in" filter="fade">
                                       <p:cBhvr>
-                                        <p:cTn id="22" dur="2000"/>
+                                        <p:cTn id="28" dur="2000"/>
                                         <p:tgtEl>
                                           <p:spTgt spid="3">
                                             <p:txEl>
@@ -9034,7 +9052,7 @@
                                     </p:animEffect>
                                     <p:anim calcmode="lin" valueType="num">
                                       <p:cBhvr>
-                                        <p:cTn id="23" dur="2000" fill="hold"/>
+                                        <p:cTn id="29" dur="2000" fill="hold"/>
                                         <p:tgtEl>
                                           <p:spTgt spid="3">
                                             <p:txEl>
@@ -9061,7 +9079,7 @@
                                     </p:anim>
                                     <p:anim calcmode="lin" valueType="num">
                                       <p:cBhvr>
-                                        <p:cTn id="24" dur="2000" fill="hold"/>
+                                        <p:cTn id="30" dur="2000" fill="hold"/>
                                         <p:tgtEl>
                                           <p:spTgt spid="3">
                                             <p:txEl>
@@ -9089,15 +9107,33 @@
                                   </p:childTnLst>
                                 </p:cTn>
                               </p:par>
+                            </p:childTnLst>
+                          </p:cTn>
+                        </p:par>
+                      </p:childTnLst>
+                    </p:cTn>
+                  </p:par>
+                  <p:par>
+                    <p:cTn id="31" fill="hold">
+                      <p:stCondLst>
+                        <p:cond delay="indefinite"/>
+                      </p:stCondLst>
+                      <p:childTnLst>
+                        <p:par>
+                          <p:cTn id="32" fill="hold">
+                            <p:stCondLst>
+                              <p:cond delay="0"/>
+                            </p:stCondLst>
+                            <p:childTnLst>
                               <p:par>
-                                <p:cTn id="25" presetID="45" presetClass="entr" presetSubtype="0" fill="hold" grpId="0" nodeType="withEffect">
+                                <p:cTn id="33" presetID="45" presetClass="entr" presetSubtype="0" fill="hold" grpId="0" nodeType="clickEffect">
                                   <p:stCondLst>
                                     <p:cond delay="0"/>
                                   </p:stCondLst>
                                   <p:childTnLst>
                                     <p:set>
                                       <p:cBhvr>
-                                        <p:cTn id="26" dur="1" fill="hold">
+                                        <p:cTn id="34" dur="1" fill="hold">
                                           <p:stCondLst>
                                             <p:cond delay="0"/>
                                           </p:stCondLst>
@@ -9119,7 +9155,7 @@
                                     </p:set>
                                     <p:animEffect transition="in" filter="fade">
                                       <p:cBhvr>
-                                        <p:cTn id="27" dur="2000"/>
+                                        <p:cTn id="35" dur="2000"/>
                                         <p:tgtEl>
                                           <p:spTgt spid="3">
                                             <p:txEl>
@@ -9131,7 +9167,7 @@
                                     </p:animEffect>
                                     <p:anim calcmode="lin" valueType="num">
                                       <p:cBhvr>
-                                        <p:cTn id="28" dur="2000" fill="hold"/>
+                                        <p:cTn id="36" dur="2000" fill="hold"/>
                                         <p:tgtEl>
                                           <p:spTgt spid="3">
                                             <p:txEl>
@@ -9158,7 +9194,7 @@
                                     </p:anim>
                                     <p:anim calcmode="lin" valueType="num">
                                       <p:cBhvr>
-                                        <p:cTn id="29" dur="2000" fill="hold"/>
+                                        <p:cTn id="37" dur="2000" fill="hold"/>
                                         <p:tgtEl>
                                           <p:spTgt spid="3">
                                             <p:txEl>
@@ -9186,15 +9222,33 @@
                                   </p:childTnLst>
                                 </p:cTn>
                               </p:par>
+                            </p:childTnLst>
+                          </p:cTn>
+                        </p:par>
+                      </p:childTnLst>
+                    </p:cTn>
+                  </p:par>
+                  <p:par>
+                    <p:cTn id="38" fill="hold">
+                      <p:stCondLst>
+                        <p:cond delay="indefinite"/>
+                      </p:stCondLst>
+                      <p:childTnLst>
+                        <p:par>
+                          <p:cTn id="39" fill="hold">
+                            <p:stCondLst>
+                              <p:cond delay="0"/>
+                            </p:stCondLst>
+                            <p:childTnLst>
                               <p:par>
-                                <p:cTn id="30" presetID="45" presetClass="entr" presetSubtype="0" fill="hold" grpId="0" nodeType="withEffect">
+                                <p:cTn id="40" presetID="45" presetClass="entr" presetSubtype="0" fill="hold" grpId="0" nodeType="clickEffect">
                                   <p:stCondLst>
                                     <p:cond delay="0"/>
                                   </p:stCondLst>
                                   <p:childTnLst>
                                     <p:set>
                                       <p:cBhvr>
-                                        <p:cTn id="31" dur="1" fill="hold">
+                                        <p:cTn id="41" dur="1" fill="hold">
                                           <p:stCondLst>
                                             <p:cond delay="0"/>
                                           </p:stCondLst>
@@ -9216,7 +9270,7 @@
                                     </p:set>
                                     <p:animEffect transition="in" filter="fade">
                                       <p:cBhvr>
-                                        <p:cTn id="32" dur="2000"/>
+                                        <p:cTn id="42" dur="2000"/>
                                         <p:tgtEl>
                                           <p:spTgt spid="3">
                                             <p:txEl>
@@ -9228,7 +9282,7 @@
                                     </p:animEffect>
                                     <p:anim calcmode="lin" valueType="num">
                                       <p:cBhvr>
-                                        <p:cTn id="33" dur="2000" fill="hold"/>
+                                        <p:cTn id="43" dur="2000" fill="hold"/>
                                         <p:tgtEl>
                                           <p:spTgt spid="3">
                                             <p:txEl>
@@ -9255,7 +9309,7 @@
                                     </p:anim>
                                     <p:anim calcmode="lin" valueType="num">
                                       <p:cBhvr>
-                                        <p:cTn id="34" dur="2000" fill="hold"/>
+                                        <p:cTn id="44" dur="2000" fill="hold"/>
                                         <p:tgtEl>
                                           <p:spTgt spid="3">
                                             <p:txEl>
@@ -9283,15 +9337,33 @@
                                   </p:childTnLst>
                                 </p:cTn>
                               </p:par>
+                            </p:childTnLst>
+                          </p:cTn>
+                        </p:par>
+                      </p:childTnLst>
+                    </p:cTn>
+                  </p:par>
+                  <p:par>
+                    <p:cTn id="45" fill="hold">
+                      <p:stCondLst>
+                        <p:cond delay="indefinite"/>
+                      </p:stCondLst>
+                      <p:childTnLst>
+                        <p:par>
+                          <p:cTn id="46" fill="hold">
+                            <p:stCondLst>
+                              <p:cond delay="0"/>
+                            </p:stCondLst>
+                            <p:childTnLst>
                               <p:par>
-                                <p:cTn id="35" presetID="45" presetClass="entr" presetSubtype="0" fill="hold" grpId="0" nodeType="withEffect">
+                                <p:cTn id="47" presetID="45" presetClass="entr" presetSubtype="0" fill="hold" grpId="0" nodeType="clickEffect">
                                   <p:stCondLst>
                                     <p:cond delay="0"/>
                                   </p:stCondLst>
                                   <p:childTnLst>
                                     <p:set>
                                       <p:cBhvr>
-                                        <p:cTn id="36" dur="1" fill="hold">
+                                        <p:cTn id="48" dur="1" fill="hold">
                                           <p:stCondLst>
                                             <p:cond delay="0"/>
                                           </p:stCondLst>
@@ -9313,7 +9385,7 @@
                                     </p:set>
                                     <p:animEffect transition="in" filter="fade">
                                       <p:cBhvr>
-                                        <p:cTn id="37" dur="2000"/>
+                                        <p:cTn id="49" dur="2000"/>
                                         <p:tgtEl>
                                           <p:spTgt spid="3">
                                             <p:txEl>
@@ -9325,7 +9397,7 @@
                                     </p:animEffect>
                                     <p:anim calcmode="lin" valueType="num">
                                       <p:cBhvr>
-                                        <p:cTn id="38" dur="2000" fill="hold"/>
+                                        <p:cTn id="50" dur="2000" fill="hold"/>
                                         <p:tgtEl>
                                           <p:spTgt spid="3">
                                             <p:txEl>
@@ -9352,7 +9424,7 @@
                                     </p:anim>
                                     <p:anim calcmode="lin" valueType="num">
                                       <p:cBhvr>
-                                        <p:cTn id="39" dur="2000" fill="hold"/>
+                                        <p:cTn id="51" dur="2000" fill="hold"/>
                                         <p:tgtEl>
                                           <p:spTgt spid="3">
                                             <p:txEl>
@@ -10159,15 +10231,6 @@
           <a:solidFill>
             <a:srgbClr val="FFFFFF"/>
           </a:solidFill>
-          <a:extLst>
-            <a:ext uri="{909E8E84-426E-40DD-AFC4-6F175D3DCCD1}">
-              <a14:hiddenFill xmlns:a14="http://schemas.microsoft.com/office/drawing/2010/main">
-                <a:solidFill>
-                  <a:srgbClr val="FFFFFF"/>
-                </a:solidFill>
-              </a14:hiddenFill>
-            </a:ext>
-          </a:extLst>
         </p:spPr>
       </p:pic>
     </p:spTree>

</xml_diff>